<commit_message>
Add support for jinja2 scheme
</commit_message>
<xml_diff>
--- a/test/data5/in.pptx
+++ b/test/data5/in.pptx
@@ -1655,7 +1655,7 @@
         <p:spPr>
           <a:xfrm>
             <a:off x="1365480" y="1987560"/>
-            <a:ext cx="10514160" cy="1324080"/>
+            <a:ext cx="10513440" cy="1323360"/>
           </a:xfrm>
           <a:prstGeom prst="rect">
             <a:avLst/>
@@ -1689,7 +1689,7 @@
                 <a:latin typeface="游ゴシック Light"/>
                 <a:ea typeface="DejaVu Sans"/>
               </a:rPr>
-              <a:t>Project for {client_name}</a:t>
+              <a:t>Project for {{ client_name }}</a:t>
             </a:r>
             <a:endParaRPr b="0" lang="fr-FR" sz="4400" spc="-1" strike="noStrike">
               <a:latin typeface="Arial"/>
@@ -1736,7 +1736,7 @@
         <p:spPr>
           <a:xfrm>
             <a:off x="838080" y="365040"/>
-            <a:ext cx="10514160" cy="1324080"/>
+            <a:ext cx="10513440" cy="1323360"/>
           </a:xfrm>
           <a:prstGeom prst="rect">
             <a:avLst/>

</xml_diff>